<commit_message>
minor changes + reordering
</commit_message>
<xml_diff>
--- a/Presentazione_Tesi_Triennale_Informatica_Unimore_2022_2023_Enrico_Marras_152336_v2.pptx
+++ b/Presentazione_Tesi_Triennale_Informatica_Unimore_2022_2023_Enrico_Marras_152336_v2.pptx
@@ -4816,7 +4816,7 @@
           <a:p>
             <a:fld id="{5A380E97-91F5-47EA-9D04-C3513F44CB51}" type="datetimeFigureOut">
               <a:rPr lang="it-IT" smtClean="0"/>
-              <a:t>23/10/2023</a:t>
+              <a:t>25/10/2023</a:t>
             </a:fld>
             <a:endParaRPr lang="it-IT"/>
           </a:p>
@@ -8341,7 +8341,7 @@
           <a:p>
             <a:fld id="{C6B94E2B-A83C-4036-B1E7-12D11015BA88}" type="datetime1">
               <a:rPr lang="it-IT" smtClean="0"/>
-              <a:t>23/10/2023</a:t>
+              <a:t>25/10/2023</a:t>
             </a:fld>
             <a:endParaRPr lang="it-IT"/>
           </a:p>
@@ -8541,7 +8541,7 @@
           <a:p>
             <a:fld id="{769333B3-E355-425F-83F1-331287CF7A51}" type="datetime1">
               <a:rPr lang="it-IT" smtClean="0"/>
-              <a:t>23/10/2023</a:t>
+              <a:t>25/10/2023</a:t>
             </a:fld>
             <a:endParaRPr lang="it-IT"/>
           </a:p>
@@ -8751,7 +8751,7 @@
           <a:p>
             <a:fld id="{96AE93DD-D37A-416F-BF2A-347FB1385994}" type="datetime1">
               <a:rPr lang="it-IT" smtClean="0"/>
-              <a:t>23/10/2023</a:t>
+              <a:t>25/10/2023</a:t>
             </a:fld>
             <a:endParaRPr lang="it-IT"/>
           </a:p>
@@ -8951,7 +8951,7 @@
           <a:p>
             <a:fld id="{D7C24D3A-F463-43E7-A97A-FE6548E45051}" type="datetime1">
               <a:rPr lang="it-IT" smtClean="0"/>
-              <a:t>23/10/2023</a:t>
+              <a:t>25/10/2023</a:t>
             </a:fld>
             <a:endParaRPr lang="it-IT"/>
           </a:p>
@@ -9227,7 +9227,7 @@
           <a:p>
             <a:fld id="{8681084F-B397-4D9A-B717-28C93DC644E1}" type="datetime1">
               <a:rPr lang="it-IT" smtClean="0"/>
-              <a:t>23/10/2023</a:t>
+              <a:t>25/10/2023</a:t>
             </a:fld>
             <a:endParaRPr lang="it-IT"/>
           </a:p>
@@ -9495,7 +9495,7 @@
           <a:p>
             <a:fld id="{B855B48F-6F92-456B-9CEB-13FA92002165}" type="datetime1">
               <a:rPr lang="it-IT" smtClean="0"/>
-              <a:t>23/10/2023</a:t>
+              <a:t>25/10/2023</a:t>
             </a:fld>
             <a:endParaRPr lang="it-IT"/>
           </a:p>
@@ -9910,7 +9910,7 @@
           <a:p>
             <a:fld id="{44F573C1-8C3B-4691-B20B-10AA4C4B9F18}" type="datetime1">
               <a:rPr lang="it-IT" smtClean="0"/>
-              <a:t>23/10/2023</a:t>
+              <a:t>25/10/2023</a:t>
             </a:fld>
             <a:endParaRPr lang="it-IT"/>
           </a:p>
@@ -10052,7 +10052,7 @@
           <a:p>
             <a:fld id="{D819F175-DCA9-4903-ACA2-7131EFAFF832}" type="datetime1">
               <a:rPr lang="it-IT" smtClean="0"/>
-              <a:t>23/10/2023</a:t>
+              <a:t>25/10/2023</a:t>
             </a:fld>
             <a:endParaRPr lang="it-IT"/>
           </a:p>
@@ -10165,7 +10165,7 @@
           <a:p>
             <a:fld id="{EF774F02-FBDA-44EF-B6F4-77D159B2D26D}" type="datetime1">
               <a:rPr lang="it-IT" smtClean="0"/>
-              <a:t>23/10/2023</a:t>
+              <a:t>25/10/2023</a:t>
             </a:fld>
             <a:endParaRPr lang="it-IT"/>
           </a:p>
@@ -10478,7 +10478,7 @@
           <a:p>
             <a:fld id="{CD2DCA2E-8382-4E58-BE53-3CA49E310222}" type="datetime1">
               <a:rPr lang="it-IT" smtClean="0"/>
-              <a:t>23/10/2023</a:t>
+              <a:t>25/10/2023</a:t>
             </a:fld>
             <a:endParaRPr lang="it-IT"/>
           </a:p>
@@ -10767,7 +10767,7 @@
           <a:p>
             <a:fld id="{5E278125-6853-43A2-991B-77B7DDCCC688}" type="datetime1">
               <a:rPr lang="it-IT" smtClean="0"/>
-              <a:t>23/10/2023</a:t>
+              <a:t>25/10/2023</a:t>
             </a:fld>
             <a:endParaRPr lang="it-IT"/>
           </a:p>
@@ -11027,7 +11027,7 @@
           <a:p>
             <a:fld id="{842C23F0-606E-4C6A-82A8-FF84B32E2232}" type="datetime1">
               <a:rPr lang="it-IT" smtClean="0"/>
-              <a:t>23/10/2023</a:t>
+              <a:t>25/10/2023</a:t>
             </a:fld>
             <a:endParaRPr lang="it-IT"/>
           </a:p>
@@ -15995,30 +15995,21 @@
                             </p:childTnLst>
                           </p:cTn>
                         </p:par>
-                      </p:childTnLst>
-                    </p:cTn>
-                  </p:par>
-                  <p:par>
-                    <p:cTn id="57" fill="hold">
-                      <p:stCondLst>
-                        <p:cond delay="indefinite"/>
-                      </p:stCondLst>
-                      <p:childTnLst>
                         <p:par>
-                          <p:cTn id="58" fill="hold">
+                          <p:cTn id="57" fill="hold">
                             <p:stCondLst>
-                              <p:cond delay="0"/>
+                              <p:cond delay="500"/>
                             </p:stCondLst>
                             <p:childTnLst>
                               <p:par>
-                                <p:cTn id="59" presetID="10" presetClass="entr" presetSubtype="0" fill="hold" nodeType="clickEffect">
+                                <p:cTn id="58" presetID="10" presetClass="entr" presetSubtype="0" fill="hold" nodeType="afterEffect">
                                   <p:stCondLst>
                                     <p:cond delay="0"/>
                                   </p:stCondLst>
                                   <p:childTnLst>
                                     <p:set>
                                       <p:cBhvr>
-                                        <p:cTn id="60" dur="1" fill="hold">
+                                        <p:cTn id="59" dur="1" fill="hold">
                                           <p:stCondLst>
                                             <p:cond delay="0"/>
                                           </p:stCondLst>
@@ -16040,7 +16031,7 @@
                                     </p:set>
                                     <p:animEffect transition="in" filter="fade">
                                       <p:cBhvr>
-                                        <p:cTn id="61" dur="500"/>
+                                        <p:cTn id="60" dur="500"/>
                                         <p:tgtEl>
                                           <p:spTgt spid="5">
                                             <p:txEl>
@@ -18898,7 +18889,7 @@
           </a:fontRef>
         </p:style>
         <p:txBody>
-          <a:bodyPr rtlCol="0" anchor="ctr"/>
+          <a:bodyPr rtlCol="0" anchor="t"/>
           <a:lstStyle/>
           <a:p>
             <a:pPr lvl="0" hangingPunct="0"/>
@@ -18942,7 +18933,31 @@
                 <a:ea typeface="Times New Roman" panose="02020603050405020304" pitchFamily="18" charset="0"/>
                 <a:cs typeface="Arial" panose="020B0604020202020204" pitchFamily="34" charset="0"/>
               </a:rPr>
-              <a:t>Monitoraggio input/output e della comunicazione</a:t>
+              <a:t>Monitoraggio </a:t>
+            </a:r>
+            <a:r>
+              <a:rPr lang="it-IT" sz="1700" i="1" dirty="0">
+                <a:solidFill>
+                  <a:schemeClr val="tx1"/>
+                </a:solidFill>
+                <a:effectLst/>
+                <a:latin typeface="Arial" panose="020B0604020202020204" pitchFamily="34" charset="0"/>
+                <a:ea typeface="Times New Roman" panose="02020603050405020304" pitchFamily="18" charset="0"/>
+                <a:cs typeface="Arial" panose="020B0604020202020204" pitchFamily="34" charset="0"/>
+              </a:rPr>
+              <a:t>input/output </a:t>
+            </a:r>
+            <a:r>
+              <a:rPr lang="it-IT" sz="1700" dirty="0">
+                <a:solidFill>
+                  <a:schemeClr val="tx1"/>
+                </a:solidFill>
+                <a:effectLst/>
+                <a:latin typeface="Arial" panose="020B0604020202020204" pitchFamily="34" charset="0"/>
+                <a:ea typeface="Times New Roman" panose="02020603050405020304" pitchFamily="18" charset="0"/>
+                <a:cs typeface="Arial" panose="020B0604020202020204" pitchFamily="34" charset="0"/>
+              </a:rPr>
+              <a:t>e della comunicazione</a:t>
             </a:r>
           </a:p>
           <a:p>
@@ -18983,6 +18998,34 @@
               <a:buFont typeface="Wingdings" panose="05000000000000000000" pitchFamily="2" charset="2"/>
               <a:buChar char="§"/>
             </a:pPr>
+            <a:endParaRPr lang="it-IT" sz="1700" dirty="0">
+              <a:solidFill>
+                <a:schemeClr val="tx1"/>
+              </a:solidFill>
+              <a:latin typeface="Arial" panose="020B0604020202020204" pitchFamily="34" charset="0"/>
+              <a:ea typeface="Times New Roman" panose="02020603050405020304" pitchFamily="18" charset="0"/>
+              <a:cs typeface="Arial" panose="020B0604020202020204" pitchFamily="34" charset="0"/>
+            </a:endParaRPr>
+          </a:p>
+          <a:p>
+            <a:pPr marL="342900" indent="-342900" hangingPunct="0">
+              <a:buFont typeface="Wingdings" panose="05000000000000000000" pitchFamily="2" charset="2"/>
+              <a:buChar char="§"/>
+            </a:pPr>
+            <a:r>
+              <a:rPr lang="it-IT" sz="1700" dirty="0">
+                <a:solidFill>
+                  <a:schemeClr val="tx1"/>
+                </a:solidFill>
+                <a:latin typeface="Arial" panose="020B0604020202020204" pitchFamily="34" charset="0"/>
+                <a:ea typeface="Times New Roman" panose="02020603050405020304" pitchFamily="18" charset="0"/>
+                <a:cs typeface="Arial" panose="020B0604020202020204" pitchFamily="34" charset="0"/>
+              </a:rPr>
+              <a:t>Gestione di diversi profili utente</a:t>
+            </a:r>
+          </a:p>
+          <a:p>
+            <a:pPr lvl="0" hangingPunct="0"/>
             <a:endParaRPr lang="it-IT" sz="1700" dirty="0">
               <a:solidFill>
                 <a:schemeClr val="tx1"/>
@@ -19069,24 +19112,6 @@
               <a:ea typeface="Times New Roman" panose="02020603050405020304" pitchFamily="18" charset="0"/>
               <a:cs typeface="Arial" panose="020B0604020202020204" pitchFamily="34" charset="0"/>
             </a:endParaRPr>
-          </a:p>
-          <a:p>
-            <a:pPr marL="342900" indent="-342900" hangingPunct="0">
-              <a:buFont typeface="Wingdings" panose="05000000000000000000" pitchFamily="2" charset="2"/>
-              <a:buChar char="§"/>
-            </a:pPr>
-            <a:r>
-              <a:rPr lang="it-IT" sz="1700" dirty="0">
-                <a:solidFill>
-                  <a:schemeClr val="tx1"/>
-                </a:solidFill>
-                <a:effectLst/>
-                <a:latin typeface="Arial" panose="020B0604020202020204" pitchFamily="34" charset="0"/>
-                <a:ea typeface="Times New Roman" panose="02020603050405020304" pitchFamily="18" charset="0"/>
-                <a:cs typeface="Arial" panose="020B0604020202020204" pitchFamily="34" charset="0"/>
-              </a:rPr>
-              <a:t>Gestione di diversi profili utente</a:t>
-            </a:r>
           </a:p>
         </p:txBody>
       </p:sp>
@@ -24908,8 +24933,8 @@
         </p:nvSpPr>
         <p:spPr>
           <a:xfrm>
-            <a:off x="2097474" y="1362074"/>
-            <a:ext cx="7997048" cy="2373929"/>
+            <a:off x="1551802" y="1642369"/>
+            <a:ext cx="9358854" cy="3746377"/>
           </a:xfrm>
           <a:prstGeom prst="roundRect">
             <a:avLst>
@@ -24942,45 +24967,18 @@
           </a:fontRef>
         </p:style>
         <p:txBody>
-          <a:bodyPr rtlCol="0" anchor="ctr"/>
+          <a:bodyPr rtlCol="0" anchor="t"/>
           <a:lstStyle/>
-          <a:p>
-            <a:pPr>
-              <a:lnSpc>
-                <a:spcPct val="150000"/>
-              </a:lnSpc>
-            </a:pPr>
-            <a:r>
-              <a:rPr lang="it-IT" sz="2400" b="1" dirty="0">
-                <a:solidFill>
-                  <a:schemeClr val="tx1"/>
-                </a:solidFill>
-                <a:latin typeface="Arial" panose="020B0604020202020204" pitchFamily="34" charset="0"/>
-                <a:cs typeface="Arial" panose="020B0604020202020204" pitchFamily="34" charset="0"/>
-              </a:rPr>
-              <a:t>Problematiche primarie</a:t>
-            </a:r>
-            <a:r>
-              <a:rPr lang="it-IT" sz="2400" dirty="0">
-                <a:solidFill>
-                  <a:schemeClr val="tx1"/>
-                </a:solidFill>
-                <a:latin typeface="Arial" panose="020B0604020202020204" pitchFamily="34" charset="0"/>
-                <a:cs typeface="Arial" panose="020B0604020202020204" pitchFamily="34" charset="0"/>
-              </a:rPr>
-              <a:t>:</a:t>
-            </a:r>
-          </a:p>
           <a:p>
             <a:pPr marL="342900" indent="-342900">
               <a:lnSpc>
-                <a:spcPct val="150000"/>
+                <a:spcPct val="200000"/>
               </a:lnSpc>
               <a:buFont typeface="Wingdings" panose="05000000000000000000" pitchFamily="2" charset="2"/>
               <a:buChar char="§"/>
             </a:pPr>
             <a:r>
-              <a:rPr lang="it-IT" sz="2400" dirty="0">
+              <a:rPr lang="it-IT" sz="2800" dirty="0">
                 <a:solidFill>
                   <a:schemeClr val="tx1"/>
                 </a:solidFill>
@@ -24993,13 +24991,13 @@
           <a:p>
             <a:pPr marL="342900" indent="-342900">
               <a:lnSpc>
-                <a:spcPct val="150000"/>
+                <a:spcPct val="200000"/>
               </a:lnSpc>
               <a:buFont typeface="Wingdings" panose="05000000000000000000" pitchFamily="2" charset="2"/>
               <a:buChar char="§"/>
             </a:pPr>
             <a:r>
-              <a:rPr lang="it-IT" sz="2400" dirty="0">
+              <a:rPr lang="it-IT" sz="2800" dirty="0">
                 <a:solidFill>
                   <a:schemeClr val="tx1"/>
                 </a:solidFill>
@@ -25012,130 +25010,32 @@
           <a:p>
             <a:pPr marL="342900" indent="-342900">
               <a:lnSpc>
-                <a:spcPct val="150000"/>
+                <a:spcPct val="200000"/>
               </a:lnSpc>
               <a:buFont typeface="Wingdings" panose="05000000000000000000" pitchFamily="2" charset="2"/>
               <a:buChar char="§"/>
             </a:pPr>
             <a:r>
-              <a:rPr lang="it-IT" sz="2400" dirty="0">
+              <a:rPr lang="it-IT" sz="2800" dirty="0">
                 <a:solidFill>
                   <a:schemeClr val="tx1"/>
                 </a:solidFill>
                 <a:latin typeface="Arial" panose="020B0604020202020204" pitchFamily="34" charset="0"/>
                 <a:cs typeface="Arial" panose="020B0604020202020204" pitchFamily="34" charset="0"/>
               </a:rPr>
-              <a:t>Dati sensibili salvati "in chiaro"</a:t>
-            </a:r>
-          </a:p>
-        </p:txBody>
-      </p:sp>
-      <p:sp>
-        <p:nvSpPr>
-          <p:cNvPr id="5" name="Rectangle: Rounded Corners 4">
-            <a:extLst>
-              <a:ext uri="{FF2B5EF4-FFF2-40B4-BE49-F238E27FC236}">
-                <a16:creationId xmlns:a16="http://schemas.microsoft.com/office/drawing/2014/main" id="{3567289C-880A-3273-65FA-C992013F2652}"/>
-              </a:ext>
-            </a:extLst>
-          </p:cNvPr>
-          <p:cNvSpPr/>
-          <p:nvPr/>
-        </p:nvSpPr>
-        <p:spPr>
-          <a:xfrm>
-            <a:off x="2097474" y="4217948"/>
-            <a:ext cx="7997048" cy="1772300"/>
-          </a:xfrm>
-          <a:prstGeom prst="roundRect">
-            <a:avLst>
-              <a:gd name="adj" fmla="val 3552"/>
-            </a:avLst>
-          </a:prstGeom>
-          <a:solidFill>
-            <a:schemeClr val="bg1"/>
-          </a:solidFill>
-          <a:ln w="28575">
-            <a:solidFill>
-              <a:schemeClr val="tx1"/>
-            </a:solidFill>
-          </a:ln>
-        </p:spPr>
-        <p:style>
-          <a:lnRef idx="2">
-            <a:schemeClr val="accent1">
-              <a:shade val="15000"/>
-            </a:schemeClr>
-          </a:lnRef>
-          <a:fillRef idx="1">
-            <a:schemeClr val="accent1"/>
-          </a:fillRef>
-          <a:effectRef idx="0">
-            <a:schemeClr val="accent1"/>
-          </a:effectRef>
-          <a:fontRef idx="minor">
-            <a:schemeClr val="lt1"/>
-          </a:fontRef>
-        </p:style>
-        <p:txBody>
-          <a:bodyPr rtlCol="0" anchor="ctr"/>
-          <a:lstStyle/>
-          <a:p>
-            <a:pPr>
-              <a:lnSpc>
-                <a:spcPct val="150000"/>
-              </a:lnSpc>
-            </a:pPr>
-            <a:r>
-              <a:rPr lang="it-IT" sz="2400" b="1" dirty="0">
-                <a:solidFill>
-                  <a:schemeClr val="tx1"/>
-                </a:solidFill>
-                <a:latin typeface="Arial" panose="020B0604020202020204" pitchFamily="34" charset="0"/>
-                <a:cs typeface="Arial" panose="020B0604020202020204" pitchFamily="34" charset="0"/>
-              </a:rPr>
-              <a:t>Problematiche secondarie</a:t>
-            </a:r>
-            <a:r>
-              <a:rPr lang="it-IT" sz="2400" dirty="0">
-                <a:solidFill>
-                  <a:schemeClr val="tx1"/>
-                </a:solidFill>
-                <a:latin typeface="Arial" panose="020B0604020202020204" pitchFamily="34" charset="0"/>
-                <a:cs typeface="Arial" panose="020B0604020202020204" pitchFamily="34" charset="0"/>
-              </a:rPr>
-              <a:t>:</a:t>
+              <a:t>Dati sensibili salvati "in chiaro" </a:t>
             </a:r>
           </a:p>
           <a:p>
             <a:pPr marL="342900" indent="-342900">
               <a:lnSpc>
-                <a:spcPct val="150000"/>
+                <a:spcPct val="200000"/>
               </a:lnSpc>
               <a:buFont typeface="Wingdings" panose="05000000000000000000" pitchFamily="2" charset="2"/>
               <a:buChar char="§"/>
             </a:pPr>
             <a:r>
-              <a:rPr lang="it-IT" sz="2400" dirty="0">
-                <a:solidFill>
-                  <a:schemeClr val="tx1"/>
-                </a:solidFill>
-                <a:latin typeface="Arial" panose="020B0604020202020204" pitchFamily="34" charset="0"/>
-                <a:cs typeface="Arial" panose="020B0604020202020204" pitchFamily="34" charset="0"/>
-              </a:rPr>
-              <a:t>Documentazione carente</a:t>
-            </a:r>
-          </a:p>
-          <a:p>
-            <a:pPr marL="342900" indent="-342900">
-              <a:lnSpc>
-                <a:spcPct val="150000"/>
-              </a:lnSpc>
-              <a:buFont typeface="Wingdings" panose="05000000000000000000" pitchFamily="2" charset="2"/>
-              <a:buChar char="§"/>
-            </a:pPr>
-            <a:r>
-              <a:rPr lang="it-IT" sz="2400" dirty="0">
+              <a:rPr lang="it-IT" sz="2800" dirty="0">
                 <a:solidFill>
                   <a:schemeClr val="tx1"/>
                 </a:solidFill>
@@ -25458,215 +25358,6 @@
                       </p:childTnLst>
                     </p:cTn>
                   </p:par>
-                  <p:par>
-                    <p:cTn id="24" fill="hold">
-                      <p:stCondLst>
-                        <p:cond delay="indefinite"/>
-                      </p:stCondLst>
-                      <p:childTnLst>
-                        <p:par>
-                          <p:cTn id="25" fill="hold">
-                            <p:stCondLst>
-                              <p:cond delay="0"/>
-                            </p:stCondLst>
-                            <p:childTnLst>
-                              <p:par>
-                                <p:cTn id="26" presetID="10" presetClass="entr" presetSubtype="0" fill="hold" grpId="0" nodeType="clickEffect">
-                                  <p:stCondLst>
-                                    <p:cond delay="0"/>
-                                  </p:stCondLst>
-                                  <p:childTnLst>
-                                    <p:set>
-                                      <p:cBhvr>
-                                        <p:cTn id="27" dur="1" fill="hold">
-                                          <p:stCondLst>
-                                            <p:cond delay="0"/>
-                                          </p:stCondLst>
-                                        </p:cTn>
-                                        <p:tgtEl>
-                                          <p:spTgt spid="5"/>
-                                        </p:tgtEl>
-                                        <p:attrNameLst>
-                                          <p:attrName>style.visibility</p:attrName>
-                                        </p:attrNameLst>
-                                      </p:cBhvr>
-                                      <p:to>
-                                        <p:strVal val="visible"/>
-                                      </p:to>
-                                    </p:set>
-                                    <p:animEffect transition="in" filter="fade">
-                                      <p:cBhvr>
-                                        <p:cTn id="28" dur="300"/>
-                                        <p:tgtEl>
-                                          <p:spTgt spid="5"/>
-                                        </p:tgtEl>
-                                      </p:cBhvr>
-                                    </p:animEffect>
-                                  </p:childTnLst>
-                                </p:cTn>
-                              </p:par>
-                            </p:childTnLst>
-                          </p:cTn>
-                        </p:par>
-                        <p:par>
-                          <p:cTn id="29" fill="hold">
-                            <p:stCondLst>
-                              <p:cond delay="300"/>
-                            </p:stCondLst>
-                            <p:childTnLst>
-                              <p:par>
-                                <p:cTn id="30" presetID="10" presetClass="entr" presetSubtype="0" fill="hold" nodeType="afterEffect">
-                                  <p:stCondLst>
-                                    <p:cond delay="0"/>
-                                  </p:stCondLst>
-                                  <p:childTnLst>
-                                    <p:set>
-                                      <p:cBhvr>
-                                        <p:cTn id="31" dur="1" fill="hold">
-                                          <p:stCondLst>
-                                            <p:cond delay="0"/>
-                                          </p:stCondLst>
-                                        </p:cTn>
-                                        <p:tgtEl>
-                                          <p:spTgt spid="5">
-                                            <p:txEl>
-                                              <p:pRg st="0" end="0"/>
-                                            </p:txEl>
-                                          </p:spTgt>
-                                        </p:tgtEl>
-                                        <p:attrNameLst>
-                                          <p:attrName>style.visibility</p:attrName>
-                                        </p:attrNameLst>
-                                      </p:cBhvr>
-                                      <p:to>
-                                        <p:strVal val="visible"/>
-                                      </p:to>
-                                    </p:set>
-                                    <p:animEffect transition="in" filter="fade">
-                                      <p:cBhvr>
-                                        <p:cTn id="32" dur="300"/>
-                                        <p:tgtEl>
-                                          <p:spTgt spid="5">
-                                            <p:txEl>
-                                              <p:pRg st="0" end="0"/>
-                                            </p:txEl>
-                                          </p:spTgt>
-                                        </p:tgtEl>
-                                      </p:cBhvr>
-                                    </p:animEffect>
-                                  </p:childTnLst>
-                                </p:cTn>
-                              </p:par>
-                            </p:childTnLst>
-                          </p:cTn>
-                        </p:par>
-                        <p:par>
-                          <p:cTn id="33" fill="hold">
-                            <p:stCondLst>
-                              <p:cond delay="600"/>
-                            </p:stCondLst>
-                            <p:childTnLst>
-                              <p:par>
-                                <p:cTn id="34" presetID="10" presetClass="entr" presetSubtype="0" fill="hold" nodeType="afterEffect">
-                                  <p:stCondLst>
-                                    <p:cond delay="0"/>
-                                  </p:stCondLst>
-                                  <p:childTnLst>
-                                    <p:set>
-                                      <p:cBhvr>
-                                        <p:cTn id="35" dur="1" fill="hold">
-                                          <p:stCondLst>
-                                            <p:cond delay="0"/>
-                                          </p:stCondLst>
-                                        </p:cTn>
-                                        <p:tgtEl>
-                                          <p:spTgt spid="5">
-                                            <p:txEl>
-                                              <p:pRg st="1" end="1"/>
-                                            </p:txEl>
-                                          </p:spTgt>
-                                        </p:tgtEl>
-                                        <p:attrNameLst>
-                                          <p:attrName>style.visibility</p:attrName>
-                                        </p:attrNameLst>
-                                      </p:cBhvr>
-                                      <p:to>
-                                        <p:strVal val="visible"/>
-                                      </p:to>
-                                    </p:set>
-                                    <p:animEffect transition="in" filter="fade">
-                                      <p:cBhvr>
-                                        <p:cTn id="36" dur="300"/>
-                                        <p:tgtEl>
-                                          <p:spTgt spid="5">
-                                            <p:txEl>
-                                              <p:pRg st="1" end="1"/>
-                                            </p:txEl>
-                                          </p:spTgt>
-                                        </p:tgtEl>
-                                      </p:cBhvr>
-                                    </p:animEffect>
-                                  </p:childTnLst>
-                                </p:cTn>
-                              </p:par>
-                            </p:childTnLst>
-                          </p:cTn>
-                        </p:par>
-                        <p:par>
-                          <p:cTn id="37" fill="hold">
-                            <p:stCondLst>
-                              <p:cond delay="900"/>
-                            </p:stCondLst>
-                            <p:childTnLst>
-                              <p:par>
-                                <p:cTn id="38" presetID="10" presetClass="entr" presetSubtype="0" fill="hold" nodeType="afterEffect">
-                                  <p:stCondLst>
-                                    <p:cond delay="0"/>
-                                  </p:stCondLst>
-                                  <p:childTnLst>
-                                    <p:set>
-                                      <p:cBhvr>
-                                        <p:cTn id="39" dur="1" fill="hold">
-                                          <p:stCondLst>
-                                            <p:cond delay="0"/>
-                                          </p:stCondLst>
-                                        </p:cTn>
-                                        <p:tgtEl>
-                                          <p:spTgt spid="5">
-                                            <p:txEl>
-                                              <p:pRg st="2" end="2"/>
-                                            </p:txEl>
-                                          </p:spTgt>
-                                        </p:tgtEl>
-                                        <p:attrNameLst>
-                                          <p:attrName>style.visibility</p:attrName>
-                                        </p:attrNameLst>
-                                      </p:cBhvr>
-                                      <p:to>
-                                        <p:strVal val="visible"/>
-                                      </p:to>
-                                    </p:set>
-                                    <p:animEffect transition="in" filter="fade">
-                                      <p:cBhvr>
-                                        <p:cTn id="40" dur="300"/>
-                                        <p:tgtEl>
-                                          <p:spTgt spid="5">
-                                            <p:txEl>
-                                              <p:pRg st="2" end="2"/>
-                                            </p:txEl>
-                                          </p:spTgt>
-                                        </p:tgtEl>
-                                      </p:cBhvr>
-                                    </p:animEffect>
-                                  </p:childTnLst>
-                                </p:cTn>
-                              </p:par>
-                            </p:childTnLst>
-                          </p:cTn>
-                        </p:par>
-                      </p:childTnLst>
-                    </p:cTn>
-                  </p:par>
                 </p:childTnLst>
               </p:cTn>
               <p:prevCondLst>
@@ -25690,7 +25381,6 @@
     </p:tnLst>
     <p:bldLst>
       <p:bldP spid="4" grpId="0" animBg="1"/>
-      <p:bldP spid="5" grpId="0" animBg="1"/>
     </p:bldLst>
   </p:timing>
 </p:sld>
@@ -25906,7 +25596,7 @@
         </p:nvSpPr>
         <p:spPr>
           <a:xfrm>
-            <a:off x="1109039" y="3103047"/>
+            <a:off x="1109039" y="3298363"/>
             <a:ext cx="3650020" cy="1058733"/>
           </a:xfrm>
           <a:prstGeom prst="roundRect">
@@ -25964,27 +25654,7 @@
                 <a:latin typeface="Arial" panose="020B0604020202020204" pitchFamily="34" charset="0"/>
                 <a:cs typeface="Arial" panose="020B0604020202020204" pitchFamily="34" charset="0"/>
               </a:rPr>
-              <a:t> </a:t>
-            </a:r>
-            <a:r>
-              <a:rPr lang="it-IT" sz="4000">
-                <a:solidFill>
-                  <a:schemeClr val="tx1"/>
-                </a:solidFill>
-                <a:latin typeface="Arial" panose="020B0604020202020204" pitchFamily="34" charset="0"/>
-                <a:cs typeface="Arial" panose="020B0604020202020204" pitchFamily="34" charset="0"/>
-              </a:rPr>
-              <a:t>(3.11.4</a:t>
-            </a:r>
-            <a:r>
-              <a:rPr lang="it-IT" sz="4000" dirty="0">
-                <a:solidFill>
-                  <a:schemeClr val="tx1"/>
-                </a:solidFill>
-                <a:latin typeface="Arial" panose="020B0604020202020204" pitchFamily="34" charset="0"/>
-                <a:cs typeface="Arial" panose="020B0604020202020204" pitchFamily="34" charset="0"/>
-              </a:rPr>
-              <a:t>)</a:t>
+              <a:t> (3.11.4)</a:t>
             </a:r>
           </a:p>
         </p:txBody>
@@ -26003,7 +25673,7 @@
         </p:nvSpPr>
         <p:spPr>
           <a:xfrm>
-            <a:off x="1109039" y="4926735"/>
+            <a:off x="1109039" y="5122051"/>
             <a:ext cx="1828125" cy="1058733"/>
           </a:xfrm>
           <a:prstGeom prst="roundRect">
@@ -26097,7 +25767,7 @@
         </p:nvCxnSpPr>
         <p:spPr>
           <a:xfrm flipV="1">
-            <a:off x="4909351" y="2788301"/>
+            <a:off x="4909351" y="2983617"/>
             <a:ext cx="1970843" cy="826421"/>
           </a:xfrm>
           <a:prstGeom prst="straightConnector1">
@@ -26148,7 +25818,7 @@
         </p:nvCxnSpPr>
         <p:spPr>
           <a:xfrm>
-            <a:off x="4909351" y="3614722"/>
+            <a:off x="4909351" y="3810038"/>
             <a:ext cx="1970843" cy="826421"/>
           </a:xfrm>
           <a:prstGeom prst="straightConnector1">
@@ -26197,7 +25867,7 @@
         </p:nvSpPr>
         <p:spPr>
           <a:xfrm>
-            <a:off x="7016457" y="2258934"/>
+            <a:off x="7016457" y="2454250"/>
             <a:ext cx="3781104" cy="1058733"/>
           </a:xfrm>
           <a:prstGeom prst="roundRect">
@@ -26271,7 +25941,7 @@
         </p:nvSpPr>
         <p:spPr>
           <a:xfrm>
-            <a:off x="7016456" y="3911776"/>
+            <a:off x="7016456" y="4107092"/>
             <a:ext cx="3781105" cy="1058733"/>
           </a:xfrm>
           <a:prstGeom prst="roundRect">
@@ -26345,8 +26015,8 @@
         </p:nvSpPr>
         <p:spPr>
           <a:xfrm>
-            <a:off x="927339" y="1107404"/>
-            <a:ext cx="10326964" cy="536232"/>
+            <a:off x="433802" y="1116425"/>
+            <a:ext cx="11314038" cy="536232"/>
           </a:xfrm>
           <a:prstGeom prst="roundRect">
             <a:avLst/>
@@ -26380,81 +26050,24 @@
           <a:bodyPr rtlCol="0" anchor="ctr"/>
           <a:lstStyle/>
           <a:p>
-            <a:pPr marL="0" marR="0" lvl="0" indent="0" algn="ctr" defTabSz="914400" rtl="0" eaLnBrk="1" fontAlgn="auto" latinLnBrk="0" hangingPunct="1">
-              <a:lnSpc>
-                <a:spcPct val="100000"/>
-              </a:lnSpc>
-              <a:spcBef>
-                <a:spcPts val="0"/>
-              </a:spcBef>
-              <a:spcAft>
-                <a:spcPts val="0"/>
-              </a:spcAft>
-              <a:buClrTx/>
-              <a:buSzTx/>
-              <a:buFontTx/>
-              <a:buNone/>
-              <a:tabLst/>
+            <a:pPr algn="ctr">
               <a:defRPr/>
             </a:pPr>
-            <a:endParaRPr kumimoji="0" lang="it-IT" sz="1800" b="0" i="0" u="none" strike="noStrike" kern="1200" cap="none" spc="0" normalizeH="0" baseline="0" noProof="0">
-              <a:ln>
-                <a:noFill/>
-              </a:ln>
-              <a:solidFill>
-                <a:prstClr val="white"/>
-              </a:solidFill>
-              <a:effectLst/>
-              <a:uLnTx/>
-              <a:uFillTx/>
-              <a:latin typeface="Arial" panose="020B0604020202020204" pitchFamily="34" charset="0"/>
-              <a:cs typeface="Arial" panose="020B0604020202020204" pitchFamily="34" charset="0"/>
-            </a:endParaRPr>
-          </a:p>
-        </p:txBody>
-      </p:sp>
-      <p:sp>
-        <p:nvSpPr>
-          <p:cNvPr id="16" name="Subtitle 2">
-            <a:extLst>
-              <a:ext uri="{FF2B5EF4-FFF2-40B4-BE49-F238E27FC236}">
-                <a16:creationId xmlns:a16="http://schemas.microsoft.com/office/drawing/2014/main" id="{458150F9-3EB6-EC3D-C3D3-DB8587BE37DE}"/>
-              </a:ext>
-            </a:extLst>
-          </p:cNvPr>
-          <p:cNvSpPr>
-            <a:spLocks noGrp="1"/>
-          </p:cNvSpPr>
-          <p:nvPr>
-            <p:ph type="subTitle" idx="1"/>
-          </p:nvPr>
-        </p:nvSpPr>
-        <p:spPr>
-          <a:xfrm>
-            <a:off x="756201" y="1210527"/>
-            <a:ext cx="10532308" cy="563259"/>
-          </a:xfrm>
-        </p:spPr>
-        <p:txBody>
-          <a:bodyPr>
-            <a:normAutofit fontScale="77500" lnSpcReduction="20000"/>
-          </a:bodyPr>
-          <a:lstStyle/>
-          <a:p>
-            <a:pPr>
-              <a:lnSpc>
-                <a:spcPct val="100000"/>
-              </a:lnSpc>
-            </a:pPr>
             <a:r>
-              <a:rPr lang="it-IT" sz="2800" dirty="0">
+              <a:rPr lang="it-IT" sz="2400" dirty="0">
+                <a:solidFill>
+                  <a:schemeClr val="tx1"/>
+                </a:solidFill>
                 <a:latin typeface="Arial" panose="020B0604020202020204" pitchFamily="34" charset="0"/>
                 <a:cs typeface="Arial" panose="020B0604020202020204" pitchFamily="34" charset="0"/>
               </a:rPr>
               <a:t>È necessario scegliere tecnologie con licenze che permettano l’</a:t>
             </a:r>
             <a:r>
-              <a:rPr lang="it-IT" sz="2800" b="1" dirty="0">
+              <a:rPr lang="it-IT" sz="2400" b="1" dirty="0">
+                <a:solidFill>
+                  <a:schemeClr val="tx1"/>
+                </a:solidFill>
                 <a:latin typeface="Arial" panose="020B0604020202020204" pitchFamily="34" charset="0"/>
                 <a:cs typeface="Arial" panose="020B0604020202020204" pitchFamily="34" charset="0"/>
               </a:rPr>
@@ -26477,7 +26090,7 @@
         </p:nvSpPr>
         <p:spPr>
           <a:xfrm>
-            <a:off x="1227573" y="4570399"/>
+            <a:off x="1227573" y="4765715"/>
             <a:ext cx="1591056" cy="400110"/>
           </a:xfrm>
           <a:prstGeom prst="rect">
@@ -26523,8 +26136,8 @@
         </p:nvCxnSpPr>
         <p:spPr>
           <a:xfrm>
-            <a:off x="596403" y="1773786"/>
-            <a:ext cx="10999194" cy="284"/>
+            <a:off x="409173" y="1806834"/>
+            <a:ext cx="11373655" cy="2748"/>
           </a:xfrm>
           <a:prstGeom prst="line">
             <a:avLst/>
@@ -26560,7 +26173,7 @@
         </p:nvSpPr>
         <p:spPr>
           <a:xfrm>
-            <a:off x="977955" y="2702369"/>
+            <a:off x="977955" y="2897685"/>
             <a:ext cx="3931396" cy="400110"/>
           </a:xfrm>
           <a:prstGeom prst="rect">
@@ -26604,7 +26217,7 @@
         </p:nvSpPr>
         <p:spPr>
           <a:xfrm>
-            <a:off x="7016457" y="1843509"/>
+            <a:off x="7016457" y="2038825"/>
             <a:ext cx="3650020" cy="400110"/>
           </a:xfrm>
           <a:prstGeom prst="rect">
@@ -26648,7 +26261,7 @@
         </p:nvSpPr>
         <p:spPr>
           <a:xfrm>
-            <a:off x="7016457" y="3511666"/>
+            <a:off x="7016457" y="3706982"/>
             <a:ext cx="3650020" cy="400110"/>
           </a:xfrm>
           <a:prstGeom prst="rect">
@@ -26772,67 +26385,15 @@
                                   </p:childTnLst>
                                 </p:cTn>
                               </p:par>
-                            </p:childTnLst>
-                          </p:cTn>
-                        </p:par>
-                        <p:par>
-                          <p:cTn id="8" fill="hold">
-                            <p:stCondLst>
-                              <p:cond delay="300"/>
-                            </p:stCondLst>
-                            <p:childTnLst>
                               <p:par>
-                                <p:cTn id="9" presetID="10" presetClass="entr" presetSubtype="0" fill="hold" nodeType="afterEffect">
+                                <p:cTn id="8" presetID="10" presetClass="entr" presetSubtype="0" fill="hold" nodeType="withEffect">
                                   <p:stCondLst>
                                     <p:cond delay="0"/>
                                   </p:stCondLst>
                                   <p:childTnLst>
                                     <p:set>
                                       <p:cBhvr>
-                                        <p:cTn id="10" dur="1" fill="hold">
-                                          <p:stCondLst>
-                                            <p:cond delay="0"/>
-                                          </p:stCondLst>
-                                        </p:cTn>
-                                        <p:tgtEl>
-                                          <p:spTgt spid="16">
-                                            <p:txEl>
-                                              <p:pRg st="0" end="0"/>
-                                            </p:txEl>
-                                          </p:spTgt>
-                                        </p:tgtEl>
-                                        <p:attrNameLst>
-                                          <p:attrName>style.visibility</p:attrName>
-                                        </p:attrNameLst>
-                                      </p:cBhvr>
-                                      <p:to>
-                                        <p:strVal val="visible"/>
-                                      </p:to>
-                                    </p:set>
-                                    <p:animEffect transition="in" filter="fade">
-                                      <p:cBhvr>
-                                        <p:cTn id="11" dur="300"/>
-                                        <p:tgtEl>
-                                          <p:spTgt spid="16">
-                                            <p:txEl>
-                                              <p:pRg st="0" end="0"/>
-                                            </p:txEl>
-                                          </p:spTgt>
-                                        </p:tgtEl>
-                                      </p:cBhvr>
-                                    </p:animEffect>
-                                  </p:childTnLst>
-                                </p:cTn>
-                              </p:par>
-                              <p:par>
-                                <p:cTn id="12" presetID="10" presetClass="entr" presetSubtype="0" fill="hold" nodeType="withEffect">
-                                  <p:stCondLst>
-                                    <p:cond delay="0"/>
-                                  </p:stCondLst>
-                                  <p:childTnLst>
-                                    <p:set>
-                                      <p:cBhvr>
-                                        <p:cTn id="13" dur="1" fill="hold">
+                                        <p:cTn id="9" dur="1" fill="hold">
                                           <p:stCondLst>
                                             <p:cond delay="0"/>
                                           </p:stCondLst>
@@ -26850,7 +26411,7 @@
                                     </p:set>
                                     <p:animEffect transition="in" filter="fade">
                                       <p:cBhvr>
-                                        <p:cTn id="14" dur="300"/>
+                                        <p:cTn id="10" dur="300"/>
                                         <p:tgtEl>
                                           <p:spTgt spid="17"/>
                                         </p:tgtEl>
@@ -26866,26 +26427,26 @@
                     </p:cTn>
                   </p:par>
                   <p:par>
-                    <p:cTn id="15" fill="hold">
+                    <p:cTn id="11" fill="hold">
                       <p:stCondLst>
                         <p:cond delay="indefinite"/>
                       </p:stCondLst>
                       <p:childTnLst>
                         <p:par>
-                          <p:cTn id="16" fill="hold">
+                          <p:cTn id="12" fill="hold">
                             <p:stCondLst>
                               <p:cond delay="0"/>
                             </p:stCondLst>
                             <p:childTnLst>
                               <p:par>
-                                <p:cTn id="17" presetID="10" presetClass="entr" presetSubtype="0" fill="hold" grpId="0" nodeType="clickEffect">
+                                <p:cTn id="13" presetID="10" presetClass="entr" presetSubtype="0" fill="hold" grpId="0" nodeType="clickEffect">
                                   <p:stCondLst>
                                     <p:cond delay="0"/>
                                   </p:stCondLst>
                                   <p:childTnLst>
                                     <p:set>
                                       <p:cBhvr>
-                                        <p:cTn id="18" dur="1" fill="hold">
+                                        <p:cTn id="14" dur="1" fill="hold">
                                           <p:stCondLst>
                                             <p:cond delay="0"/>
                                           </p:stCondLst>
@@ -26903,7 +26464,7 @@
                                     </p:set>
                                     <p:animEffect transition="in" filter="fade">
                                       <p:cBhvr>
-                                        <p:cTn id="19" dur="500"/>
+                                        <p:cTn id="15" dur="500"/>
                                         <p:tgtEl>
                                           <p:spTgt spid="4"/>
                                         </p:tgtEl>
@@ -26913,14 +26474,14 @@
                                 </p:cTn>
                               </p:par>
                               <p:par>
-                                <p:cTn id="20" presetID="10" presetClass="entr" presetSubtype="0" fill="hold" grpId="0" nodeType="withEffect">
+                                <p:cTn id="16" presetID="10" presetClass="entr" presetSubtype="0" fill="hold" grpId="0" nodeType="withEffect">
                                   <p:stCondLst>
                                     <p:cond delay="0"/>
                                   </p:stCondLst>
                                   <p:childTnLst>
                                     <p:set>
                                       <p:cBhvr>
-                                        <p:cTn id="21" dur="1" fill="hold">
+                                        <p:cTn id="17" dur="1" fill="hold">
                                           <p:stCondLst>
                                             <p:cond delay="0"/>
                                           </p:stCondLst>
@@ -26938,7 +26499,7 @@
                                     </p:set>
                                     <p:animEffect transition="in" filter="fade">
                                       <p:cBhvr>
-                                        <p:cTn id="22" dur="500"/>
+                                        <p:cTn id="18" dur="500"/>
                                         <p:tgtEl>
                                           <p:spTgt spid="20"/>
                                         </p:tgtEl>
@@ -26954,26 +26515,26 @@
                     </p:cTn>
                   </p:par>
                   <p:par>
-                    <p:cTn id="23" fill="hold">
+                    <p:cTn id="19" fill="hold">
                       <p:stCondLst>
                         <p:cond delay="indefinite"/>
                       </p:stCondLst>
                       <p:childTnLst>
                         <p:par>
-                          <p:cTn id="24" fill="hold">
+                          <p:cTn id="20" fill="hold">
                             <p:stCondLst>
                               <p:cond delay="0"/>
                             </p:stCondLst>
                             <p:childTnLst>
                               <p:par>
-                                <p:cTn id="25" presetID="10" presetClass="entr" presetSubtype="0" fill="hold" nodeType="clickEffect">
+                                <p:cTn id="21" presetID="10" presetClass="entr" presetSubtype="0" fill="hold" nodeType="clickEffect">
                                   <p:stCondLst>
                                     <p:cond delay="0"/>
                                   </p:stCondLst>
                                   <p:childTnLst>
                                     <p:set>
                                       <p:cBhvr>
-                                        <p:cTn id="26" dur="1" fill="hold">
+                                        <p:cTn id="22" dur="1" fill="hold">
                                           <p:stCondLst>
                                             <p:cond delay="0"/>
                                           </p:stCondLst>
@@ -26991,7 +26552,7 @@
                                     </p:set>
                                     <p:animEffect transition="in" filter="fade">
                                       <p:cBhvr>
-                                        <p:cTn id="27" dur="500"/>
+                                        <p:cTn id="23" dur="500"/>
                                         <p:tgtEl>
                                           <p:spTgt spid="6"/>
                                         </p:tgtEl>
@@ -27001,14 +26562,102 @@
                                 </p:cTn>
                               </p:par>
                               <p:par>
-                                <p:cTn id="28" presetID="10" presetClass="entr" presetSubtype="0" fill="hold" nodeType="withEffect">
+                                <p:cTn id="24" presetID="10" presetClass="entr" presetSubtype="0" fill="hold" grpId="0" nodeType="withEffect">
                                   <p:stCondLst>
                                     <p:cond delay="0"/>
                                   </p:stCondLst>
                                   <p:childTnLst>
                                     <p:set>
                                       <p:cBhvr>
-                                        <p:cTn id="29" dur="1" fill="hold">
+                                        <p:cTn id="25" dur="1" fill="hold">
+                                          <p:stCondLst>
+                                            <p:cond delay="0"/>
+                                          </p:stCondLst>
+                                        </p:cTn>
+                                        <p:tgtEl>
+                                          <p:spTgt spid="14"/>
+                                        </p:tgtEl>
+                                        <p:attrNameLst>
+                                          <p:attrName>style.visibility</p:attrName>
+                                        </p:attrNameLst>
+                                      </p:cBhvr>
+                                      <p:to>
+                                        <p:strVal val="visible"/>
+                                      </p:to>
+                                    </p:set>
+                                    <p:animEffect transition="in" filter="fade">
+                                      <p:cBhvr>
+                                        <p:cTn id="26" dur="500"/>
+                                        <p:tgtEl>
+                                          <p:spTgt spid="14"/>
+                                        </p:tgtEl>
+                                      </p:cBhvr>
+                                    </p:animEffect>
+                                  </p:childTnLst>
+                                </p:cTn>
+                              </p:par>
+                              <p:par>
+                                <p:cTn id="27" presetID="10" presetClass="entr" presetSubtype="0" fill="hold" grpId="0" nodeType="withEffect">
+                                  <p:stCondLst>
+                                    <p:cond delay="0"/>
+                                  </p:stCondLst>
+                                  <p:childTnLst>
+                                    <p:set>
+                                      <p:cBhvr>
+                                        <p:cTn id="28" dur="1" fill="hold">
+                                          <p:stCondLst>
+                                            <p:cond delay="0"/>
+                                          </p:stCondLst>
+                                        </p:cTn>
+                                        <p:tgtEl>
+                                          <p:spTgt spid="21"/>
+                                        </p:tgtEl>
+                                        <p:attrNameLst>
+                                          <p:attrName>style.visibility</p:attrName>
+                                        </p:attrNameLst>
+                                      </p:cBhvr>
+                                      <p:to>
+                                        <p:strVal val="visible"/>
+                                      </p:to>
+                                    </p:set>
+                                    <p:animEffect transition="in" filter="fade">
+                                      <p:cBhvr>
+                                        <p:cTn id="29" dur="500"/>
+                                        <p:tgtEl>
+                                          <p:spTgt spid="21"/>
+                                        </p:tgtEl>
+                                      </p:cBhvr>
+                                    </p:animEffect>
+                                  </p:childTnLst>
+                                </p:cTn>
+                              </p:par>
+                            </p:childTnLst>
+                          </p:cTn>
+                        </p:par>
+                      </p:childTnLst>
+                    </p:cTn>
+                  </p:par>
+                  <p:par>
+                    <p:cTn id="30" fill="hold">
+                      <p:stCondLst>
+                        <p:cond delay="indefinite"/>
+                      </p:stCondLst>
+                      <p:childTnLst>
+                        <p:par>
+                          <p:cTn id="31" fill="hold">
+                            <p:stCondLst>
+                              <p:cond delay="0"/>
+                            </p:stCondLst>
+                            <p:childTnLst>
+                              <p:par>
+                                <p:cTn id="32" presetID="10" presetClass="entr" presetSubtype="0" fill="hold" nodeType="clickEffect">
+                                  <p:stCondLst>
+                                    <p:cond delay="0"/>
+                                  </p:stCondLst>
+                                  <p:childTnLst>
+                                    <p:set>
+                                      <p:cBhvr>
+                                        <p:cTn id="33" dur="1" fill="hold">
                                           <p:stCondLst>
                                             <p:cond delay="0"/>
                                           </p:stCondLst>
@@ -27026,7 +26675,7 @@
                                     </p:set>
                                     <p:animEffect transition="in" filter="fade">
                                       <p:cBhvr>
-                                        <p:cTn id="30" dur="500"/>
+                                        <p:cTn id="34" dur="500"/>
                                         <p:tgtEl>
                                           <p:spTgt spid="7"/>
                                         </p:tgtEl>
@@ -27036,20 +26685,20 @@
                                 </p:cTn>
                               </p:par>
                               <p:par>
-                                <p:cTn id="31" presetID="10" presetClass="entr" presetSubtype="0" fill="hold" grpId="0" nodeType="withEffect">
+                                <p:cTn id="35" presetID="10" presetClass="entr" presetSubtype="0" fill="hold" grpId="0" nodeType="withEffect">
                                   <p:stCondLst>
                                     <p:cond delay="0"/>
                                   </p:stCondLst>
                                   <p:childTnLst>
                                     <p:set>
                                       <p:cBhvr>
-                                        <p:cTn id="32" dur="1" fill="hold">
+                                        <p:cTn id="36" dur="1" fill="hold">
                                           <p:stCondLst>
                                             <p:cond delay="0"/>
                                           </p:stCondLst>
                                         </p:cTn>
                                         <p:tgtEl>
-                                          <p:spTgt spid="14"/>
+                                          <p:spTgt spid="15"/>
                                         </p:tgtEl>
                                         <p:attrNameLst>
                                           <p:attrName>style.visibility</p:attrName>
@@ -27061,9 +26710,9 @@
                                     </p:set>
                                     <p:animEffect transition="in" filter="fade">
                                       <p:cBhvr>
-                                        <p:cTn id="33" dur="500"/>
+                                        <p:cTn id="37" dur="500"/>
                                         <p:tgtEl>
-                                          <p:spTgt spid="14"/>
+                                          <p:spTgt spid="15"/>
                                         </p:tgtEl>
                                       </p:cBhvr>
                                     </p:animEffect>
@@ -27071,49 +26720,14 @@
                                 </p:cTn>
                               </p:par>
                               <p:par>
-                                <p:cTn id="34" presetID="10" presetClass="entr" presetSubtype="0" fill="hold" grpId="0" nodeType="withEffect">
+                                <p:cTn id="38" presetID="10" presetClass="entr" presetSubtype="0" fill="hold" grpId="0" nodeType="withEffect">
                                   <p:stCondLst>
                                     <p:cond delay="0"/>
                                   </p:stCondLst>
                                   <p:childTnLst>
                                     <p:set>
                                       <p:cBhvr>
-                                        <p:cTn id="35" dur="1" fill="hold">
-                                          <p:stCondLst>
-                                            <p:cond delay="0"/>
-                                          </p:stCondLst>
-                                        </p:cTn>
-                                        <p:tgtEl>
-                                          <p:spTgt spid="21"/>
-                                        </p:tgtEl>
-                                        <p:attrNameLst>
-                                          <p:attrName>style.visibility</p:attrName>
-                                        </p:attrNameLst>
-                                      </p:cBhvr>
-                                      <p:to>
-                                        <p:strVal val="visible"/>
-                                      </p:to>
-                                    </p:set>
-                                    <p:animEffect transition="in" filter="fade">
-                                      <p:cBhvr>
-                                        <p:cTn id="36" dur="500"/>
-                                        <p:tgtEl>
-                                          <p:spTgt spid="21"/>
-                                        </p:tgtEl>
-                                      </p:cBhvr>
-                                    </p:animEffect>
-                                  </p:childTnLst>
-                                </p:cTn>
-                              </p:par>
-                              <p:par>
-                                <p:cTn id="37" presetID="10" presetClass="entr" presetSubtype="0" fill="hold" grpId="0" nodeType="withEffect">
-                                  <p:stCondLst>
-                                    <p:cond delay="0"/>
-                                  </p:stCondLst>
-                                  <p:childTnLst>
-                                    <p:set>
-                                      <p:cBhvr>
-                                        <p:cTn id="38" dur="1" fill="hold">
+                                        <p:cTn id="39" dur="1" fill="hold">
                                           <p:stCondLst>
                                             <p:cond delay="0"/>
                                           </p:stCondLst>
@@ -27131,44 +26745,9 @@
                                     </p:set>
                                     <p:animEffect transition="in" filter="fade">
                                       <p:cBhvr>
-                                        <p:cTn id="39" dur="500"/>
+                                        <p:cTn id="40" dur="500"/>
                                         <p:tgtEl>
                                           <p:spTgt spid="22"/>
-                                        </p:tgtEl>
-                                      </p:cBhvr>
-                                    </p:animEffect>
-                                  </p:childTnLst>
-                                </p:cTn>
-                              </p:par>
-                              <p:par>
-                                <p:cTn id="40" presetID="10" presetClass="entr" presetSubtype="0" fill="hold" grpId="0" nodeType="withEffect">
-                                  <p:stCondLst>
-                                    <p:cond delay="0"/>
-                                  </p:stCondLst>
-                                  <p:childTnLst>
-                                    <p:set>
-                                      <p:cBhvr>
-                                        <p:cTn id="41" dur="1" fill="hold">
-                                          <p:stCondLst>
-                                            <p:cond delay="0"/>
-                                          </p:stCondLst>
-                                        </p:cTn>
-                                        <p:tgtEl>
-                                          <p:spTgt spid="15"/>
-                                        </p:tgtEl>
-                                        <p:attrNameLst>
-                                          <p:attrName>style.visibility</p:attrName>
-                                        </p:attrNameLst>
-                                      </p:cBhvr>
-                                      <p:to>
-                                        <p:strVal val="visible"/>
-                                      </p:to>
-                                    </p:set>
-                                    <p:animEffect transition="in" filter="fade">
-                                      <p:cBhvr>
-                                        <p:cTn id="42" dur="500"/>
-                                        <p:tgtEl>
-                                          <p:spTgt spid="15"/>
                                         </p:tgtEl>
                                       </p:cBhvr>
                                     </p:animEffect>
@@ -27182,26 +26761,26 @@
                     </p:cTn>
                   </p:par>
                   <p:par>
-                    <p:cTn id="43" fill="hold">
+                    <p:cTn id="41" fill="hold">
                       <p:stCondLst>
                         <p:cond delay="indefinite"/>
                       </p:stCondLst>
                       <p:childTnLst>
                         <p:par>
-                          <p:cTn id="44" fill="hold">
+                          <p:cTn id="42" fill="hold">
                             <p:stCondLst>
                               <p:cond delay="0"/>
                             </p:stCondLst>
                             <p:childTnLst>
                               <p:par>
-                                <p:cTn id="45" presetID="10" presetClass="entr" presetSubtype="0" fill="hold" grpId="0" nodeType="clickEffect">
+                                <p:cTn id="43" presetID="10" presetClass="entr" presetSubtype="0" fill="hold" grpId="0" nodeType="clickEffect">
                                   <p:stCondLst>
                                     <p:cond delay="0"/>
                                   </p:stCondLst>
                                   <p:childTnLst>
                                     <p:set>
                                       <p:cBhvr>
-                                        <p:cTn id="46" dur="1" fill="hold">
+                                        <p:cTn id="44" dur="1" fill="hold">
                                           <p:stCondLst>
                                             <p:cond delay="0"/>
                                           </p:stCondLst>
@@ -27219,7 +26798,7 @@
                                     </p:set>
                                     <p:animEffect transition="in" filter="fade">
                                       <p:cBhvr>
-                                        <p:cTn id="47" dur="500"/>
+                                        <p:cTn id="45" dur="500"/>
                                         <p:tgtEl>
                                           <p:spTgt spid="19"/>
                                         </p:tgtEl>
@@ -27229,14 +26808,14 @@
                                 </p:cTn>
                               </p:par>
                               <p:par>
-                                <p:cTn id="48" presetID="10" presetClass="entr" presetSubtype="0" fill="hold" grpId="0" nodeType="withEffect">
+                                <p:cTn id="46" presetID="10" presetClass="entr" presetSubtype="0" fill="hold" grpId="0" nodeType="withEffect">
                                   <p:stCondLst>
                                     <p:cond delay="0"/>
                                   </p:stCondLst>
                                   <p:childTnLst>
                                     <p:set>
                                       <p:cBhvr>
-                                        <p:cTn id="49" dur="1" fill="hold">
+                                        <p:cTn id="47" dur="1" fill="hold">
                                           <p:stCondLst>
                                             <p:cond delay="0"/>
                                           </p:stCondLst>
@@ -27254,7 +26833,7 @@
                                     </p:set>
                                     <p:animEffect transition="in" filter="fade">
                                       <p:cBhvr>
-                                        <p:cTn id="50" dur="500"/>
+                                        <p:cTn id="48" dur="500"/>
                                         <p:tgtEl>
                                           <p:spTgt spid="13"/>
                                         </p:tgtEl>

</xml_diff>